<commit_message>
Se realizaron los ejercicios de SVM y KNN Se dieron varias materias de SVM y KNN
</commit_message>
<xml_diff>
--- a/1-Supervisado/3-Reg&Class/7-SVM/ML - SVM.pptx
+++ b/1-Supervisado/3-Reg&Class/7-SVM/ML - SVM.pptx
@@ -3084,13 +3084,9 @@
             </a:r>
             <a:r>
               <a:rPr lang="es-ES" dirty="0"/>
-              <a:t> </a:t>
+              <a:t> (columnas)</a:t>
             </a:r>
-            <a:r>
-              <a:rPr lang="es-ES"/>
-              <a:t>(columnas)</a:t>
-            </a:r>
-            <a:endParaRPr/>
+            <a:endParaRPr dirty="0"/>
           </a:p>
         </p:txBody>
       </p:sp>

</xml_diff>